<commit_message>
added last minute changes
final commit
</commit_message>
<xml_diff>
--- a/Monday.comHackathon.pptx
+++ b/Monday.comHackathon.pptx
@@ -5,10 +5,11 @@
     <p:sldMasterId id="2147483648" r:id="rId1"/>
   </p:sldMasterIdLst>
   <p:notesMasterIdLst>
-    <p:notesMasterId r:id="rId3"/>
+    <p:notesMasterId r:id="rId4"/>
   </p:notesMasterIdLst>
   <p:sldIdLst>
     <p:sldId id="271" r:id="rId2"/>
+    <p:sldId id="272" r:id="rId3"/>
   </p:sldIdLst>
   <p:sldSz cx="12192000" cy="6858000"/>
   <p:notesSz cx="6858000" cy="9144000"/>
@@ -131,8 +132,8 @@
 <pc:chgInfo xmlns:a="http://schemas.openxmlformats.org/drawingml/2006/main" xmlns:r="http://schemas.openxmlformats.org/officeDocument/2006/relationships" xmlns:ac="http://schemas.microsoft.com/office/drawing/2013/main/command" xmlns:pc="http://schemas.microsoft.com/office/powerpoint/2013/main/command">
   <pc:docChgLst>
     <pc:chgData name="Mike Cairns" userId="63c70413ac02f94d" providerId="LiveId" clId="{DD17AAD0-0890-418D-8C93-0AF362F18E14}"/>
-    <pc:docChg chg="delSld">
-      <pc:chgData name="Mike Cairns" userId="63c70413ac02f94d" providerId="LiveId" clId="{DD17AAD0-0890-418D-8C93-0AF362F18E14}" dt="2020-11-30T23:36:07.253" v="6" actId="47"/>
+    <pc:docChg chg="custSel addSld delSld modSld">
+      <pc:chgData name="Mike Cairns" userId="63c70413ac02f94d" providerId="LiveId" clId="{DD17AAD0-0890-418D-8C93-0AF362F18E14}" dt="2020-12-01T01:25:24.647" v="420" actId="115"/>
       <pc:docMkLst>
         <pc:docMk/>
       </pc:docMkLst>
@@ -142,6 +143,44 @@
           <pc:docMk/>
           <pc:sldMk cId="1409592162" sldId="256"/>
         </pc:sldMkLst>
+      </pc:sldChg>
+      <pc:sldChg chg="modSp mod">
+        <pc:chgData name="Mike Cairns" userId="63c70413ac02f94d" providerId="LiveId" clId="{DD17AAD0-0890-418D-8C93-0AF362F18E14}" dt="2020-11-30T23:52:15.666" v="172" actId="20577"/>
+        <pc:sldMkLst>
+          <pc:docMk/>
+          <pc:sldMk cId="4050894198" sldId="271"/>
+        </pc:sldMkLst>
+        <pc:spChg chg="mod">
+          <ac:chgData name="Mike Cairns" userId="63c70413ac02f94d" providerId="LiveId" clId="{DD17AAD0-0890-418D-8C93-0AF362F18E14}" dt="2020-11-30T23:52:15.666" v="172" actId="20577"/>
+          <ac:spMkLst>
+            <pc:docMk/>
+            <pc:sldMk cId="4050894198" sldId="271"/>
+            <ac:spMk id="3" creationId="{F6E40F16-0F89-4ED6-B021-4AF9712786D5}"/>
+          </ac:spMkLst>
+        </pc:spChg>
+      </pc:sldChg>
+      <pc:sldChg chg="modSp new mod">
+        <pc:chgData name="Mike Cairns" userId="63c70413ac02f94d" providerId="LiveId" clId="{DD17AAD0-0890-418D-8C93-0AF362F18E14}" dt="2020-12-01T01:25:24.647" v="420" actId="115"/>
+        <pc:sldMkLst>
+          <pc:docMk/>
+          <pc:sldMk cId="4060115600" sldId="272"/>
+        </pc:sldMkLst>
+        <pc:spChg chg="mod">
+          <ac:chgData name="Mike Cairns" userId="63c70413ac02f94d" providerId="LiveId" clId="{DD17AAD0-0890-418D-8C93-0AF362F18E14}" dt="2020-12-01T01:21:16.143" v="185" actId="20577"/>
+          <ac:spMkLst>
+            <pc:docMk/>
+            <pc:sldMk cId="4060115600" sldId="272"/>
+            <ac:spMk id="2" creationId="{8C62F32E-575C-4A95-B599-A27F75DE77A8}"/>
+          </ac:spMkLst>
+        </pc:spChg>
+        <pc:spChg chg="mod">
+          <ac:chgData name="Mike Cairns" userId="63c70413ac02f94d" providerId="LiveId" clId="{DD17AAD0-0890-418D-8C93-0AF362F18E14}" dt="2020-12-01T01:25:24.647" v="420" actId="115"/>
+          <ac:spMkLst>
+            <pc:docMk/>
+            <pc:sldMk cId="4060115600" sldId="272"/>
+            <ac:spMk id="3" creationId="{76A8C071-2A2D-4A6F-9EA3-C118D1B75DEE}"/>
+          </ac:spMkLst>
+        </pc:spChg>
       </pc:sldChg>
       <pc:sldChg chg="del">
         <pc:chgData name="Mike Cairns" userId="63c70413ac02f94d" providerId="LiveId" clId="{DD17AAD0-0890-418D-8C93-0AF362F18E14}" dt="2020-11-30T23:36:07.253" v="6" actId="47"/>
@@ -7451,7 +7490,7 @@
           <a:lstStyle/>
           <a:p>
             <a:r>
-              <a:rPr lang="en-US" sz="3200"/>
+              <a:rPr lang="en-US" sz="3200" dirty="0"/>
               <a:t>What is Our Hack</a:t>
             </a:r>
           </a:p>
@@ -7489,8 +7528,23 @@
               <a:buNone/>
             </a:pPr>
             <a:r>
-              <a:rPr lang="en-US" sz="1600"/>
-              <a:t>With COVID19 parents must juggle both working at home and helping their kids with school. Our hack’s goal was to make helping the kids with their homework easier.</a:t>
+              <a:rPr lang="en-US" sz="1600" dirty="0"/>
+              <a:t>With COVID19 parents must juggle both working at home and helping their kids with school. </a:t>
+            </a:r>
+          </a:p>
+          <a:p>
+            <a:pPr marL="0" indent="0">
+              <a:buNone/>
+            </a:pPr>
+            <a:endParaRPr lang="en-US" sz="1600" dirty="0"/>
+          </a:p>
+          <a:p>
+            <a:pPr marL="0" indent="0">
+              <a:buNone/>
+            </a:pPr>
+            <a:r>
+              <a:rPr lang="en-US" sz="1600" dirty="0"/>
+              <a:t>Our hack’s goal was to make helping the kids track school due dates and attending school video learning on time for each kid.</a:t>
             </a:r>
           </a:p>
         </p:txBody>
@@ -7598,6 +7652,244 @@
     <p:extLst>
       <p:ext uri="{BB962C8B-B14F-4D97-AF65-F5344CB8AC3E}">
         <p14:creationId xmlns:p14="http://schemas.microsoft.com/office/powerpoint/2010/main" val="4050894198"/>
+      </p:ext>
+    </p:extLst>
+  </p:cSld>
+  <p:clrMapOvr>
+    <a:masterClrMapping/>
+  </p:clrMapOvr>
+</p:sld>
+</file>
+
+<file path=ppt/slides/slide2.xml><?xml version="1.0" encoding="utf-8"?>
+<p:sld xmlns:a="http://schemas.openxmlformats.org/drawingml/2006/main" xmlns:r="http://schemas.openxmlformats.org/officeDocument/2006/relationships" xmlns:p="http://schemas.openxmlformats.org/presentationml/2006/main">
+  <p:cSld>
+    <p:spTree>
+      <p:nvGrpSpPr>
+        <p:cNvPr id="1" name=""/>
+        <p:cNvGrpSpPr/>
+        <p:nvPr/>
+      </p:nvGrpSpPr>
+      <p:grpSpPr>
+        <a:xfrm>
+          <a:off x="0" y="0"/>
+          <a:ext cx="0" cy="0"/>
+          <a:chOff x="0" y="0"/>
+          <a:chExt cx="0" cy="0"/>
+        </a:xfrm>
+      </p:grpSpPr>
+      <p:sp>
+        <p:nvSpPr>
+          <p:cNvPr id="2" name="Title 1">
+            <a:extLst>
+              <a:ext uri="{FF2B5EF4-FFF2-40B4-BE49-F238E27FC236}">
+                <a16:creationId xmlns:a16="http://schemas.microsoft.com/office/drawing/2014/main" id="{8C62F32E-575C-4A95-B599-A27F75DE77A8}"/>
+              </a:ext>
+            </a:extLst>
+          </p:cNvPr>
+          <p:cNvSpPr>
+            <a:spLocks noGrp="1"/>
+          </p:cNvSpPr>
+          <p:nvPr>
+            <p:ph type="title"/>
+          </p:nvPr>
+        </p:nvSpPr>
+        <p:spPr/>
+        <p:txBody>
+          <a:bodyPr/>
+          <a:lstStyle/>
+          <a:p>
+            <a:r>
+              <a:rPr lang="en-US" dirty="0"/>
+              <a:t>App Features</a:t>
+            </a:r>
+          </a:p>
+        </p:txBody>
+      </p:sp>
+      <p:sp>
+        <p:nvSpPr>
+          <p:cNvPr id="3" name="Content Placeholder 2">
+            <a:extLst>
+              <a:ext uri="{FF2B5EF4-FFF2-40B4-BE49-F238E27FC236}">
+                <a16:creationId xmlns:a16="http://schemas.microsoft.com/office/drawing/2014/main" id="{76A8C071-2A2D-4A6F-9EA3-C118D1B75DEE}"/>
+              </a:ext>
+            </a:extLst>
+          </p:cNvPr>
+          <p:cNvSpPr>
+            <a:spLocks noGrp="1"/>
+          </p:cNvSpPr>
+          <p:nvPr>
+            <p:ph idx="1"/>
+          </p:nvPr>
+        </p:nvSpPr>
+        <p:spPr/>
+        <p:txBody>
+          <a:bodyPr>
+            <a:normAutofit/>
+          </a:bodyPr>
+          <a:lstStyle/>
+          <a:p>
+            <a:pPr marL="457200" indent="-457200">
+              <a:buFont typeface="+mj-lt"/>
+              <a:buAutoNum type="arabicPeriod"/>
+            </a:pPr>
+            <a:r>
+              <a:rPr lang="en-US" sz="3600" dirty="0">
+                <a:solidFill>
+                  <a:schemeClr val="accent1">
+                    <a:lumMod val="20000"/>
+                    <a:lumOff val="80000"/>
+                  </a:schemeClr>
+                </a:solidFill>
+              </a:rPr>
+              <a:t>Get to </a:t>
+            </a:r>
+            <a:r>
+              <a:rPr lang="en-US" sz="3600" b="1" u="sng" dirty="0">
+                <a:solidFill>
+                  <a:schemeClr val="accent1">
+                    <a:lumMod val="20000"/>
+                    <a:lumOff val="80000"/>
+                  </a:schemeClr>
+                </a:solidFill>
+              </a:rPr>
+              <a:t>Zoom Videos and Google Video </a:t>
+            </a:r>
+            <a:r>
+              <a:rPr lang="en-US" sz="3600" dirty="0">
+                <a:solidFill>
+                  <a:schemeClr val="accent1">
+                    <a:lumMod val="20000"/>
+                    <a:lumOff val="80000"/>
+                  </a:schemeClr>
+                </a:solidFill>
+              </a:rPr>
+              <a:t>Meetings </a:t>
+            </a:r>
+            <a:r>
+              <a:rPr lang="en-US" sz="3600" u="sng" dirty="0">
+                <a:solidFill>
+                  <a:schemeClr val="accent1">
+                    <a:lumMod val="20000"/>
+                    <a:lumOff val="80000"/>
+                  </a:schemeClr>
+                </a:solidFill>
+              </a:rPr>
+              <a:t>on time</a:t>
+            </a:r>
+          </a:p>
+          <a:p>
+            <a:pPr marL="457200" indent="-457200">
+              <a:buFont typeface="+mj-lt"/>
+              <a:buAutoNum type="arabicPeriod"/>
+            </a:pPr>
+            <a:r>
+              <a:rPr lang="en-US" sz="3600" b="1" u="sng" dirty="0">
+                <a:solidFill>
+                  <a:schemeClr val="accent1">
+                    <a:lumMod val="40000"/>
+                    <a:lumOff val="60000"/>
+                  </a:schemeClr>
+                </a:solidFill>
+              </a:rPr>
+              <a:t>Set Timelines</a:t>
+            </a:r>
+            <a:r>
+              <a:rPr lang="en-US" sz="3600" u="sng" dirty="0">
+                <a:solidFill>
+                  <a:schemeClr val="accent1">
+                    <a:lumMod val="40000"/>
+                    <a:lumOff val="60000"/>
+                  </a:schemeClr>
+                </a:solidFill>
+              </a:rPr>
+              <a:t> </a:t>
+            </a:r>
+            <a:r>
+              <a:rPr lang="en-US" sz="3600" dirty="0">
+                <a:solidFill>
+                  <a:schemeClr val="accent1">
+                    <a:lumMod val="40000"/>
+                    <a:lumOff val="60000"/>
+                  </a:schemeClr>
+                </a:solidFill>
+              </a:rPr>
+              <a:t>for study time prior to tests &amp; quizzes</a:t>
+            </a:r>
+          </a:p>
+          <a:p>
+            <a:pPr marL="457200" indent="-457200">
+              <a:buFont typeface="+mj-lt"/>
+              <a:buAutoNum type="arabicPeriod"/>
+            </a:pPr>
+            <a:r>
+              <a:rPr lang="en-US" sz="3600" b="1" u="sng" dirty="0">
+                <a:solidFill>
+                  <a:schemeClr val="accent1">
+                    <a:lumMod val="60000"/>
+                    <a:lumOff val="40000"/>
+                  </a:schemeClr>
+                </a:solidFill>
+              </a:rPr>
+              <a:t>Track Due Dates </a:t>
+            </a:r>
+            <a:r>
+              <a:rPr lang="en-US" sz="3600" dirty="0">
+                <a:solidFill>
+                  <a:schemeClr val="accent1">
+                    <a:lumMod val="60000"/>
+                    <a:lumOff val="40000"/>
+                  </a:schemeClr>
+                </a:solidFill>
+              </a:rPr>
+              <a:t>for Kids </a:t>
+            </a:r>
+            <a:r>
+              <a:rPr lang="en-US" sz="3600" b="1" dirty="0">
+                <a:solidFill>
+                  <a:schemeClr val="accent1">
+                    <a:lumMod val="60000"/>
+                    <a:lumOff val="40000"/>
+                  </a:schemeClr>
+                </a:solidFill>
+              </a:rPr>
+              <a:t>Assignments</a:t>
+            </a:r>
+          </a:p>
+          <a:p>
+            <a:pPr marL="457200" indent="-457200">
+              <a:buFont typeface="+mj-lt"/>
+              <a:buAutoNum type="arabicPeriod"/>
+            </a:pPr>
+            <a:r>
+              <a:rPr lang="en-US" sz="3600" b="1" u="sng" dirty="0">
+                <a:solidFill>
+                  <a:schemeClr val="accent4">
+                    <a:lumMod val="60000"/>
+                    <a:lumOff val="40000"/>
+                  </a:schemeClr>
+                </a:solidFill>
+              </a:rPr>
+              <a:t>Trigger reminders </a:t>
+            </a:r>
+            <a:r>
+              <a:rPr lang="en-US" sz="3600" dirty="0">
+                <a:solidFill>
+                  <a:schemeClr val="accent4">
+                    <a:lumMod val="60000"/>
+                    <a:lumOff val="40000"/>
+                  </a:schemeClr>
+                </a:solidFill>
+              </a:rPr>
+              <a:t>via Monday.com Notifications</a:t>
+            </a:r>
+          </a:p>
+        </p:txBody>
+      </p:sp>
+    </p:spTree>
+    <p:extLst>
+      <p:ext uri="{BB962C8B-B14F-4D97-AF65-F5344CB8AC3E}">
+        <p14:creationId xmlns:p14="http://schemas.microsoft.com/office/powerpoint/2010/main" val="4060115600"/>
       </p:ext>
     </p:extLst>
   </p:cSld>

</xml_diff>